<commit_message>
Creation of Thymeleaf version guidelines. terasolunaorg/guideline#3084
</commit_message>
<xml_diff>
--- a/source/ArchitectureInDetail/WebApplicationDetail/images_ExceptionHandling/materialExceptionHandling.pptx
+++ b/source/ArchitectureInDetail/WebApplicationDetail/images_ExceptionHandling/materialExceptionHandling.pptx
@@ -154,7 +154,7 @@
       </p14:sectionLst>
     </p:ext>
     <p:ext uri="{EFAFB233-063F-42B5-8137-9DF3F51BA10A}">
-      <p15:sldGuideLst xmlns:p15="http://schemas.microsoft.com/office/powerpoint/2012/main" xmlns="">
+      <p15:sldGuideLst xmlns="" xmlns:p15="http://schemas.microsoft.com/office/powerpoint/2012/main">
         <p15:guide id="1" orient="horz" pos="2160">
           <p15:clr>
             <a:srgbClr val="A4A3A4"/>
@@ -254,7 +254,7 @@
             <a:fld id="{3BB47352-BF5A-4CD2-B029-996118CD8E01}" type="datetimeFigureOut">
               <a:rPr kumimoji="1" lang="ja-JP" altLang="en-US" smtClean="0"/>
               <a:pPr/>
-              <a:t>2017/6/16</a:t>
+              <a:t>2017/11/21</a:t>
             </a:fld>
             <a:endParaRPr kumimoji="1" lang="ja-JP" altLang="en-US" dirty="0"/>
           </a:p>
@@ -1502,7 +1502,7 @@
             <a:fld id="{7B9B12EC-6AA0-374B-A2D3-850081A07A26}" type="datetimeFigureOut">
               <a:rPr kumimoji="1" lang="ja-JP" altLang="en-US" smtClean="0"/>
               <a:pPr/>
-              <a:t>2017/6/16</a:t>
+              <a:t>2017/11/21</a:t>
             </a:fld>
             <a:endParaRPr kumimoji="1" lang="ja-JP" altLang="en-US" dirty="0"/>
           </a:p>
@@ -1706,7 +1706,7 @@
             <a:fld id="{7B9B12EC-6AA0-374B-A2D3-850081A07A26}" type="datetimeFigureOut">
               <a:rPr kumimoji="1" lang="ja-JP" altLang="en-US" smtClean="0"/>
               <a:pPr/>
-              <a:t>2017/6/16</a:t>
+              <a:t>2017/11/21</a:t>
             </a:fld>
             <a:endParaRPr kumimoji="1" lang="ja-JP" altLang="en-US" dirty="0"/>
           </a:p>
@@ -1920,7 +1920,7 @@
             <a:fld id="{7B9B12EC-6AA0-374B-A2D3-850081A07A26}" type="datetimeFigureOut">
               <a:rPr kumimoji="1" lang="ja-JP" altLang="en-US" smtClean="0"/>
               <a:pPr/>
-              <a:t>2017/6/16</a:t>
+              <a:t>2017/11/21</a:t>
             </a:fld>
             <a:endParaRPr kumimoji="1" lang="ja-JP" altLang="en-US" dirty="0"/>
           </a:p>
@@ -2124,7 +2124,7 @@
             <a:fld id="{7B9B12EC-6AA0-374B-A2D3-850081A07A26}" type="datetimeFigureOut">
               <a:rPr kumimoji="1" lang="ja-JP" altLang="en-US" smtClean="0"/>
               <a:pPr/>
-              <a:t>2017/6/16</a:t>
+              <a:t>2017/11/21</a:t>
             </a:fld>
             <a:endParaRPr kumimoji="1" lang="ja-JP" altLang="en-US" dirty="0"/>
           </a:p>
@@ -2372,7 +2372,7 @@
             <a:fld id="{7B9B12EC-6AA0-374B-A2D3-850081A07A26}" type="datetimeFigureOut">
               <a:rPr kumimoji="1" lang="ja-JP" altLang="en-US" smtClean="0"/>
               <a:pPr/>
-              <a:t>2017/6/16</a:t>
+              <a:t>2017/11/21</a:t>
             </a:fld>
             <a:endParaRPr kumimoji="1" lang="ja-JP" altLang="en-US" dirty="0"/>
           </a:p>
@@ -2726,7 +2726,7 @@
             <a:fld id="{7B9B12EC-6AA0-374B-A2D3-850081A07A26}" type="datetimeFigureOut">
               <a:rPr kumimoji="1" lang="ja-JP" altLang="en-US" smtClean="0"/>
               <a:pPr/>
-              <a:t>2017/6/16</a:t>
+              <a:t>2017/11/21</a:t>
             </a:fld>
             <a:endParaRPr kumimoji="1" lang="ja-JP" altLang="en-US" dirty="0"/>
           </a:p>
@@ -3214,7 +3214,7 @@
             <a:fld id="{7B9B12EC-6AA0-374B-A2D3-850081A07A26}" type="datetimeFigureOut">
               <a:rPr kumimoji="1" lang="ja-JP" altLang="en-US" smtClean="0"/>
               <a:pPr/>
-              <a:t>2017/6/16</a:t>
+              <a:t>2017/11/21</a:t>
             </a:fld>
             <a:endParaRPr kumimoji="1" lang="ja-JP" altLang="en-US" dirty="0"/>
           </a:p>
@@ -3334,7 +3334,7 @@
             <a:fld id="{7B9B12EC-6AA0-374B-A2D3-850081A07A26}" type="datetimeFigureOut">
               <a:rPr kumimoji="1" lang="ja-JP" altLang="en-US" smtClean="0"/>
               <a:pPr/>
-              <a:t>2017/6/16</a:t>
+              <a:t>2017/11/21</a:t>
             </a:fld>
             <a:endParaRPr kumimoji="1" lang="ja-JP" altLang="en-US" dirty="0"/>
           </a:p>
@@ -3431,7 +3431,7 @@
             <a:fld id="{7B9B12EC-6AA0-374B-A2D3-850081A07A26}" type="datetimeFigureOut">
               <a:rPr kumimoji="1" lang="ja-JP" altLang="en-US" smtClean="0"/>
               <a:pPr/>
-              <a:t>2017/6/16</a:t>
+              <a:t>2017/11/21</a:t>
             </a:fld>
             <a:endParaRPr kumimoji="1" lang="ja-JP" altLang="en-US" dirty="0"/>
           </a:p>
@@ -3742,7 +3742,7 @@
             <a:fld id="{7B9B12EC-6AA0-374B-A2D3-850081A07A26}" type="datetimeFigureOut">
               <a:rPr kumimoji="1" lang="ja-JP" altLang="en-US" smtClean="0"/>
               <a:pPr/>
-              <a:t>2017/6/16</a:t>
+              <a:t>2017/11/21</a:t>
             </a:fld>
             <a:endParaRPr kumimoji="1" lang="ja-JP" altLang="en-US" dirty="0"/>
           </a:p>
@@ -3997,7 +3997,7 @@
             <a:fld id="{7B9B12EC-6AA0-374B-A2D3-850081A07A26}" type="datetimeFigureOut">
               <a:rPr kumimoji="1" lang="ja-JP" altLang="en-US" smtClean="0"/>
               <a:pPr/>
-              <a:t>2017/6/16</a:t>
+              <a:t>2017/11/21</a:t>
             </a:fld>
             <a:endParaRPr kumimoji="1" lang="ja-JP" altLang="en-US" dirty="0"/>
           </a:p>
@@ -4244,7 +4244,7 @@
             <a:fld id="{7B9B12EC-6AA0-374B-A2D3-850081A07A26}" type="datetimeFigureOut">
               <a:rPr kumimoji="1" lang="ja-JP" altLang="en-US" smtClean="0"/>
               <a:pPr/>
-              <a:t>2017/6/16</a:t>
+              <a:t>2017/11/21</a:t>
             </a:fld>
             <a:endParaRPr kumimoji="1" lang="ja-JP" altLang="en-US" dirty="0"/>
           </a:p>
@@ -6864,14 +6864,14 @@
         <p:nvCxnSpPr>
           <p:cNvPr id="72" name="直線矢印コネクタ 13"/>
           <p:cNvCxnSpPr>
-            <a:endCxn id="68" idx="0"/>
+            <a:stCxn id="43" idx="1"/>
           </p:cNvCxnSpPr>
           <p:nvPr/>
         </p:nvCxnSpPr>
         <p:spPr>
           <a:xfrm rot="10800000" flipV="1">
-            <a:off x="1874445" y="3164519"/>
-            <a:ext cx="1479512" cy="1183751"/>
+            <a:off x="2612779" y="3092728"/>
+            <a:ext cx="741179" cy="1473151"/>
           </a:xfrm>
           <a:prstGeom prst="curvedConnector2">
             <a:avLst/>
@@ -7075,7 +7075,7 @@
         </p:nvSpPr>
         <p:spPr>
           <a:xfrm>
-            <a:off x="5555540" y="4256287"/>
+            <a:off x="5907828" y="4173791"/>
             <a:ext cx="476250" cy="338554"/>
           </a:xfrm>
           <a:prstGeom prst="rect">
@@ -7158,7 +7158,7 @@
         </p:nvSpPr>
         <p:spPr>
           <a:xfrm>
-            <a:off x="2549349" y="3405311"/>
+            <a:off x="2334642" y="3397797"/>
             <a:ext cx="476250" cy="338554"/>
           </a:xfrm>
           <a:prstGeom prst="rect">
@@ -7195,7 +7195,7 @@
         </p:nvSpPr>
         <p:spPr>
           <a:xfrm>
-            <a:off x="2675532" y="4256287"/>
+            <a:off x="3359380" y="4118455"/>
             <a:ext cx="476250" cy="338554"/>
           </a:xfrm>
           <a:prstGeom prst="rect">
@@ -7241,7 +7241,7 @@
         </p:nvSpPr>
         <p:spPr>
           <a:xfrm>
-            <a:off x="3257810" y="4019941"/>
+            <a:off x="3941490" y="3960119"/>
             <a:ext cx="1502883" cy="1158862"/>
           </a:xfrm>
           <a:prstGeom prst="rect">
@@ -7311,8 +7311,8 @@
         </p:nvCxnSpPr>
         <p:spPr>
           <a:xfrm rot="5400000">
-            <a:off x="4626202" y="3317244"/>
-            <a:ext cx="1228963" cy="1551656"/>
+            <a:off x="4997953" y="3629173"/>
+            <a:ext cx="1169141" cy="867976"/>
           </a:xfrm>
           <a:prstGeom prst="curvedConnector2">
             <a:avLst/>
@@ -7478,7 +7478,7 @@
         </p:nvSpPr>
         <p:spPr>
           <a:xfrm>
-            <a:off x="1437142" y="4348271"/>
+            <a:off x="1522602" y="4228627"/>
             <a:ext cx="874606" cy="681242"/>
           </a:xfrm>
           <a:prstGeom prst="flowChartDocument">
@@ -7534,7 +7534,7 @@
                   <a:schemeClr val="bg1"/>
                 </a:solidFill>
               </a:rPr>
-              <a:t>yyy.jsp</a:t>
+              <a:t>yyy.html</a:t>
             </a:r>
             <a:endParaRPr kumimoji="1" lang="en-US" altLang="ja-JP" sz="1400" dirty="0" smtClean="0">
               <a:solidFill>
@@ -7552,7 +7552,7 @@
         </p:nvSpPr>
         <p:spPr>
           <a:xfrm>
-            <a:off x="1579906" y="4941903"/>
+            <a:off x="2263586" y="4565879"/>
             <a:ext cx="1123667" cy="573262"/>
           </a:xfrm>
           <a:prstGeom prst="rect">
@@ -7580,23 +7580,32 @@
             <a:pPr algn="ctr"/>
             <a:r>
               <a:rPr kumimoji="1" lang="en-US" altLang="ja-JP" sz="900" dirty="0" smtClean="0"/>
-              <a:t>&lt;jsp tag library&gt;</a:t>
-            </a:r>
-          </a:p>
-          <a:p>
-            <a:pPr algn="ctr"/>
-            <a:r>
-              <a:rPr lang="en-US" altLang="ja-JP" sz="1200" dirty="0" smtClean="0"/>
-              <a:t>Messages</a:t>
-            </a:r>
-          </a:p>
-          <a:p>
-            <a:pPr algn="ctr"/>
-            <a:r>
-              <a:rPr lang="en-US" altLang="ja-JP" sz="1200" dirty="0" smtClean="0"/>
-              <a:t>PanelTag</a:t>
-            </a:r>
-            <a:endParaRPr kumimoji="1" lang="ja-JP" altLang="en-US" sz="1200" dirty="0"/>
+              <a:t>&lt;</a:t>
+            </a:r>
+            <a:r>
+              <a:rPr kumimoji="1" lang="en-US" altLang="ja-JP" sz="900" dirty="0" err="1" smtClean="0"/>
+              <a:t>Thymeleaf</a:t>
+            </a:r>
+            <a:r>
+              <a:rPr kumimoji="1" lang="en-US" altLang="ja-JP" sz="900" dirty="0" smtClean="0"/>
+              <a:t>&gt;</a:t>
+            </a:r>
+          </a:p>
+          <a:p>
+            <a:pPr algn="ctr"/>
+            <a:r>
+              <a:rPr lang="en-US" altLang="ja-JP" sz="1200" dirty="0" err="1"/>
+              <a:t>Thymeleaf</a:t>
+            </a:r>
+            <a:endParaRPr lang="en-US" altLang="ja-JP" sz="1200" dirty="0"/>
+          </a:p>
+          <a:p>
+            <a:pPr algn="ctr"/>
+            <a:r>
+              <a:rPr lang="en-US" altLang="ja-JP" sz="1200" dirty="0"/>
+              <a:t>View</a:t>
+            </a:r>
+            <a:endParaRPr lang="ja-JP" altLang="en-US" sz="1200" dirty="0"/>
           </a:p>
         </p:txBody>
       </p:sp>
@@ -7611,13 +7620,13 @@
         </p:nvCxnSpPr>
         <p:spPr>
           <a:xfrm rot="16200000" flipH="1">
-            <a:off x="2279340" y="4804302"/>
+            <a:off x="2963020" y="4428278"/>
             <a:ext cx="286631" cy="561833"/>
           </a:xfrm>
           <a:prstGeom prst="curvedConnector4">
             <a:avLst>
-              <a:gd name="adj1" fmla="val -139179"/>
-              <a:gd name="adj2" fmla="val 273125"/>
+              <a:gd name="adj1" fmla="val -35032"/>
+              <a:gd name="adj2" fmla="val 269978"/>
             </a:avLst>
           </a:prstGeom>
           <a:ln>
@@ -7648,7 +7657,7 @@
         </p:nvSpPr>
         <p:spPr>
           <a:xfrm>
-            <a:off x="3581255" y="4402890"/>
+            <a:off x="4264935" y="4343068"/>
             <a:ext cx="883600" cy="609328"/>
           </a:xfrm>
           <a:prstGeom prst="rect">
@@ -9490,8 +9499,8 @@
         </p:nvSpPr>
         <p:spPr>
           <a:xfrm>
-            <a:off x="1341346" y="3769005"/>
-            <a:ext cx="1261303" cy="681242"/>
+            <a:off x="1154133" y="4049879"/>
+            <a:ext cx="1165285" cy="681242"/>
           </a:xfrm>
           <a:prstGeom prst="flowChartDocument">
             <a:avLst/>
@@ -9541,7 +9550,7 @@
           <a:p>
             <a:pPr algn="ctr"/>
             <a:r>
-              <a:rPr lang="en-US" altLang="ja-JP" sz="1400" dirty="0" smtClean="0">
+              <a:rPr lang="en-US" altLang="ja-JP" sz="1200" dirty="0" smtClean="0">
                 <a:solidFill>
                   <a:schemeClr val="bg1"/>
                 </a:solidFill>
@@ -9552,14 +9561,14 @@
           <a:p>
             <a:pPr algn="ctr"/>
             <a:r>
-              <a:rPr lang="en-US" altLang="ja-JP" sz="1400" dirty="0" smtClean="0">
+              <a:rPr lang="en-US" altLang="ja-JP" sz="1200" dirty="0" smtClean="0">
                 <a:solidFill>
                   <a:schemeClr val="bg1"/>
                 </a:solidFill>
               </a:rPr>
-              <a:t>Exception.jsp</a:t>
-            </a:r>
-            <a:endParaRPr kumimoji="1" lang="en-US" altLang="ja-JP" sz="1400" dirty="0" smtClean="0">
+              <a:t>Exception.html</a:t>
+            </a:r>
+            <a:endParaRPr kumimoji="1" lang="en-US" altLang="ja-JP" sz="1200" dirty="0" smtClean="0">
               <a:solidFill>
                 <a:schemeClr val="bg1"/>
               </a:solidFill>
@@ -9677,16 +9686,20 @@
       <p:cxnSp>
         <p:nvCxnSpPr>
           <p:cNvPr id="72" name="直線矢印コネクタ 13"/>
-          <p:cNvCxnSpPr/>
+          <p:cNvCxnSpPr>
+            <a:endCxn id="69" idx="0"/>
+          </p:cNvCxnSpPr>
           <p:nvPr/>
         </p:nvCxnSpPr>
         <p:spPr>
-          <a:xfrm rot="10800000" flipV="1">
-            <a:off x="1971999" y="1430375"/>
-            <a:ext cx="1328169" cy="2328137"/>
-          </a:xfrm>
-          <a:prstGeom prst="curvedConnector2">
-            <a:avLst/>
+          <a:xfrm rot="5400000">
+            <a:off x="1739077" y="1969603"/>
+            <a:ext cx="2147104" cy="986419"/>
+          </a:xfrm>
+          <a:prstGeom prst="curvedConnector3">
+            <a:avLst>
+              <a:gd name="adj1" fmla="val 646"/>
+            </a:avLst>
           </a:prstGeom>
           <a:ln>
             <a:tailEnd type="arrow"/>
@@ -9887,7 +9900,7 @@
         </p:nvSpPr>
         <p:spPr>
           <a:xfrm>
-            <a:off x="2198576" y="2522000"/>
+            <a:off x="1899974" y="2088658"/>
             <a:ext cx="476250" cy="338554"/>
           </a:xfrm>
           <a:prstGeom prst="rect">
@@ -10210,20 +10223,20 @@
         <p:nvCxnSpPr>
           <p:cNvPr id="73" name="直線矢印コネクタ 13"/>
           <p:cNvCxnSpPr>
-            <a:stCxn id="52" idx="3"/>
-            <a:endCxn id="52" idx="2"/>
+            <a:stCxn id="69" idx="3"/>
+            <a:endCxn id="69" idx="2"/>
           </p:cNvCxnSpPr>
           <p:nvPr/>
         </p:nvCxnSpPr>
         <p:spPr>
           <a:xfrm flipH="1">
-            <a:off x="1971998" y="4109626"/>
-            <a:ext cx="630651" cy="295583"/>
+            <a:off x="2319419" y="3822995"/>
+            <a:ext cx="561833" cy="286631"/>
           </a:xfrm>
           <a:prstGeom prst="curvedConnector4">
             <a:avLst>
-              <a:gd name="adj1" fmla="val -26296"/>
-              <a:gd name="adj2" fmla="val 322990"/>
+              <a:gd name="adj1" fmla="val -20914"/>
+              <a:gd name="adj2" fmla="val 412309"/>
             </a:avLst>
           </a:prstGeom>
           <a:ln>
@@ -10670,7 +10683,7 @@
         </p:nvSpPr>
         <p:spPr>
           <a:xfrm>
-            <a:off x="2364524" y="4403060"/>
+            <a:off x="2473241" y="4324409"/>
             <a:ext cx="476250" cy="338554"/>
           </a:xfrm>
           <a:prstGeom prst="rect">
@@ -11815,6 +11828,71 @@
           </p:txBody>
         </p:sp>
       </p:grpSp>
+      <p:sp>
+        <p:nvSpPr>
+          <p:cNvPr id="69" name="正方形/長方形 68"/>
+          <p:cNvSpPr/>
+          <p:nvPr/>
+        </p:nvSpPr>
+        <p:spPr>
+          <a:xfrm>
+            <a:off x="1757585" y="3536364"/>
+            <a:ext cx="1123667" cy="573262"/>
+          </a:xfrm>
+          <a:prstGeom prst="rect">
+            <a:avLst/>
+          </a:prstGeom>
+        </p:spPr>
+        <p:style>
+          <a:lnRef idx="1">
+            <a:schemeClr val="accent1"/>
+          </a:lnRef>
+          <a:fillRef idx="3">
+            <a:schemeClr val="accent1"/>
+          </a:fillRef>
+          <a:effectRef idx="2">
+            <a:schemeClr val="accent1"/>
+          </a:effectRef>
+          <a:fontRef idx="minor">
+            <a:schemeClr val="lt1"/>
+          </a:fontRef>
+        </p:style>
+        <p:txBody>
+          <a:bodyPr rtlCol="0" anchor="ctr"/>
+          <a:lstStyle/>
+          <a:p>
+            <a:pPr algn="ctr"/>
+            <a:r>
+              <a:rPr kumimoji="1" lang="en-US" altLang="ja-JP" sz="900" dirty="0" smtClean="0"/>
+              <a:t>&lt;</a:t>
+            </a:r>
+            <a:r>
+              <a:rPr kumimoji="1" lang="en-US" altLang="ja-JP" sz="900" dirty="0" err="1" smtClean="0"/>
+              <a:t>Thymeleaf</a:t>
+            </a:r>
+            <a:r>
+              <a:rPr kumimoji="1" lang="en-US" altLang="ja-JP" sz="900" dirty="0" smtClean="0"/>
+              <a:t>&gt;</a:t>
+            </a:r>
+          </a:p>
+          <a:p>
+            <a:pPr algn="ctr"/>
+            <a:r>
+              <a:rPr lang="en-US" altLang="ja-JP" sz="1200" dirty="0" err="1"/>
+              <a:t>Thymeleaf</a:t>
+            </a:r>
+            <a:endParaRPr lang="en-US" altLang="ja-JP" sz="1200" dirty="0"/>
+          </a:p>
+          <a:p>
+            <a:pPr algn="ctr"/>
+            <a:r>
+              <a:rPr lang="en-US" altLang="ja-JP" sz="1200" dirty="0"/>
+              <a:t>View</a:t>
+            </a:r>
+            <a:endParaRPr lang="ja-JP" altLang="en-US" sz="1200" dirty="0"/>
+          </a:p>
+        </p:txBody>
+      </p:sp>
     </p:spTree>
     <p:extLst>
       <p:ext uri="{BB962C8B-B14F-4D97-AF65-F5344CB8AC3E}">
@@ -24773,7 +24851,23 @@
                   <a:schemeClr val="tx1"/>
                 </a:solidFill>
               </a:rPr>
-              <a:t>&gt;/requestError.jsp&lt;/</a:t>
+              <a:t>&gt;/</a:t>
+            </a:r>
+            <a:r>
+              <a:rPr lang="en-US" altLang="ja-JP" sz="1200" b="1" dirty="0" err="1" smtClean="0">
+                <a:solidFill>
+                  <a:schemeClr val="tx1"/>
+                </a:solidFill>
+              </a:rPr>
+              <a:t>requestError</a:t>
+            </a:r>
+            <a:r>
+              <a:rPr lang="en-US" altLang="ja-JP" sz="1200" b="1" dirty="0" smtClean="0">
+                <a:solidFill>
+                  <a:schemeClr val="tx1"/>
+                </a:solidFill>
+              </a:rPr>
+              <a:t>&lt;/</a:t>
             </a:r>
             <a:r>
               <a:rPr lang="en-US" altLang="ja-JP" sz="1200" b="1" dirty="0">
@@ -28104,7 +28198,7 @@
             <a:pPr algn="ctr"/>
             <a:r>
               <a:rPr lang="en-US" altLang="ja-JP" sz="1400" b="1" dirty="0" smtClean="0"/>
-              <a:t>xxx.jsp</a:t>
+              <a:t>xxx.html</a:t>
             </a:r>
             <a:endParaRPr lang="en-US" altLang="ja-JP" sz="1400" b="1" dirty="0"/>
           </a:p>
@@ -28531,8 +28625,8 @@
         </p:nvGrpSpPr>
         <p:grpSpPr>
           <a:xfrm>
-            <a:off x="5013401" y="3625257"/>
-            <a:ext cx="1112438" cy="783486"/>
+            <a:off x="4947868" y="3625257"/>
+            <a:ext cx="1310615" cy="878632"/>
             <a:chOff x="5775544" y="3053452"/>
             <a:chExt cx="1112438" cy="555462"/>
           </a:xfrm>
@@ -28621,7 +28715,18 @@
                     <a:schemeClr val="bg1"/>
                   </a:solidFill>
                 </a:rPr>
-                <a:t>JSP</a:t>
+                <a:t>Template</a:t>
+              </a:r>
+            </a:p>
+            <a:p>
+              <a:pPr algn="ctr"/>
+              <a:r>
+                <a:rPr lang="en-US" altLang="ja-JP" sz="1200" dirty="0" smtClean="0">
+                  <a:solidFill>
+                    <a:schemeClr val="bg1"/>
+                  </a:solidFill>
+                </a:rPr>
+                <a:t>Processing</a:t>
               </a:r>
             </a:p>
             <a:p>
@@ -29046,13 +29151,16 @@
       <p:cxnSp>
         <p:nvCxnSpPr>
           <p:cNvPr id="72" name="直線矢印コネクタ 13"/>
-          <p:cNvCxnSpPr/>
+          <p:cNvCxnSpPr>
+            <a:stCxn id="43" idx="2"/>
+            <a:endCxn id="245" idx="0"/>
+          </p:cNvCxnSpPr>
           <p:nvPr/>
         </p:nvCxnSpPr>
         <p:spPr>
-          <a:xfrm rot="10800000" flipV="1">
-            <a:off x="2234073" y="2626389"/>
-            <a:ext cx="619124" cy="823045"/>
+          <a:xfrm rot="5400000">
+            <a:off x="2571474" y="2899596"/>
+            <a:ext cx="772677" cy="901669"/>
           </a:xfrm>
           <a:prstGeom prst="curvedConnector3">
             <a:avLst>
@@ -29481,7 +29589,7 @@
         </p:nvSpPr>
         <p:spPr>
           <a:xfrm>
-            <a:off x="5401034" y="4036691"/>
+            <a:off x="5631776" y="4036691"/>
             <a:ext cx="476250" cy="338554"/>
           </a:xfrm>
           <a:prstGeom prst="rect">
@@ -29539,7 +29647,7 @@
         </p:nvSpPr>
         <p:spPr>
           <a:xfrm>
-            <a:off x="2552685" y="3110881"/>
+            <a:off x="2523943" y="3101610"/>
             <a:ext cx="476250" cy="338554"/>
           </a:xfrm>
           <a:prstGeom prst="rect">
@@ -29585,7 +29693,7 @@
         </p:nvSpPr>
         <p:spPr>
           <a:xfrm>
-            <a:off x="2790810" y="4580269"/>
+            <a:off x="3021552" y="4580269"/>
             <a:ext cx="476250" cy="338554"/>
           </a:xfrm>
           <a:prstGeom prst="rect">
@@ -29631,7 +29739,7 @@
         </p:nvSpPr>
         <p:spPr>
           <a:xfrm>
-            <a:off x="3315063" y="3621949"/>
+            <a:off x="3545805" y="3621949"/>
             <a:ext cx="1502883" cy="1158862"/>
           </a:xfrm>
           <a:prstGeom prst="rect">
@@ -29724,8 +29832,8 @@
         </p:nvSpPr>
         <p:spPr>
           <a:xfrm>
-            <a:off x="1359467" y="2788784"/>
-            <a:ext cx="874606" cy="1143647"/>
+            <a:off x="1362682" y="3331795"/>
+            <a:ext cx="874606" cy="741101"/>
           </a:xfrm>
           <a:prstGeom prst="flowChartDocument">
             <a:avLst/>
@@ -29777,7 +29885,7 @@
                   <a:schemeClr val="bg1"/>
                 </a:solidFill>
               </a:rPr>
-              <a:t>xxx.jsp</a:t>
+              <a:t>xxx.html</a:t>
             </a:r>
             <a:endParaRPr kumimoji="1" lang="en-US" altLang="ja-JP" sz="1400" dirty="0" smtClean="0">
               <a:solidFill>
@@ -29795,7 +29903,7 @@
         </p:nvSpPr>
         <p:spPr>
           <a:xfrm>
-            <a:off x="1761659" y="3736769"/>
+            <a:off x="1992401" y="3736769"/>
             <a:ext cx="1029151" cy="573262"/>
           </a:xfrm>
           <a:prstGeom prst="rect">
@@ -29823,21 +29931,30 @@
             <a:pPr algn="ctr"/>
             <a:r>
               <a:rPr kumimoji="1" lang="en-US" altLang="ja-JP" sz="900" dirty="0" smtClean="0"/>
-              <a:t>&lt;jsp tag library&gt;</a:t>
-            </a:r>
-          </a:p>
-          <a:p>
-            <a:pPr algn="ctr"/>
-            <a:r>
-              <a:rPr lang="en-US" altLang="ja-JP" sz="1200" dirty="0" smtClean="0"/>
-              <a:t>Messages</a:t>
-            </a:r>
-          </a:p>
-          <a:p>
-            <a:pPr algn="ctr"/>
-            <a:r>
-              <a:rPr lang="en-US" altLang="ja-JP" sz="1200" dirty="0" smtClean="0"/>
-              <a:t>PanelTag</a:t>
+              <a:t>&lt;</a:t>
+            </a:r>
+            <a:r>
+              <a:rPr kumimoji="1" lang="en-US" altLang="ja-JP" sz="900" dirty="0" err="1" smtClean="0"/>
+              <a:t>Thymeleaf</a:t>
+            </a:r>
+            <a:r>
+              <a:rPr kumimoji="1" lang="en-US" altLang="ja-JP" sz="900" dirty="0" smtClean="0"/>
+              <a:t>&gt;</a:t>
+            </a:r>
+          </a:p>
+          <a:p>
+            <a:pPr algn="ctr"/>
+            <a:r>
+              <a:rPr kumimoji="1" lang="en-US" altLang="ja-JP" sz="1200" dirty="0" err="1" smtClean="0"/>
+              <a:t>Thymeleaf</a:t>
+            </a:r>
+            <a:endParaRPr kumimoji="1" lang="en-US" altLang="ja-JP" sz="1200" dirty="0" smtClean="0"/>
+          </a:p>
+          <a:p>
+            <a:pPr algn="ctr"/>
+            <a:r>
+              <a:rPr kumimoji="1" lang="en-US" altLang="ja-JP" sz="1200" dirty="0" smtClean="0"/>
+              <a:t>View</a:t>
             </a:r>
             <a:endParaRPr kumimoji="1" lang="ja-JP" altLang="en-US" sz="1200" dirty="0"/>
           </a:p>
@@ -30021,13 +30138,13 @@
         </p:nvCxnSpPr>
         <p:spPr>
           <a:xfrm flipH="1">
-            <a:off x="2276235" y="4023400"/>
+            <a:off x="2506977" y="4023400"/>
             <a:ext cx="514575" cy="286631"/>
           </a:xfrm>
           <a:prstGeom prst="curvedConnector4">
             <a:avLst>
-              <a:gd name="adj1" fmla="val -182055"/>
-              <a:gd name="adj2" fmla="val 186009"/>
+              <a:gd name="adj1" fmla="val -192232"/>
+              <a:gd name="adj2" fmla="val 179754"/>
             </a:avLst>
           </a:prstGeom>
           <a:ln>
@@ -30057,7 +30174,7 @@
         </p:nvSpPr>
         <p:spPr>
           <a:xfrm>
-            <a:off x="3638508" y="4004898"/>
+            <a:off x="3869250" y="4004898"/>
             <a:ext cx="883600" cy="609328"/>
           </a:xfrm>
           <a:prstGeom prst="rect">
@@ -30150,13 +30267,16 @@
       <p:cxnSp>
         <p:nvCxnSpPr>
           <p:cNvPr id="286" name="直線コネクタ 285"/>
-          <p:cNvCxnSpPr/>
+          <p:cNvCxnSpPr>
+            <a:stCxn id="284" idx="3"/>
+            <a:endCxn id="285" idx="1"/>
+          </p:cNvCxnSpPr>
           <p:nvPr/>
         </p:nvCxnSpPr>
         <p:spPr>
           <a:xfrm>
-            <a:off x="4551371" y="4316333"/>
-            <a:ext cx="1812926" cy="0"/>
+            <a:off x="4752850" y="4309562"/>
+            <a:ext cx="1678108" cy="6771"/>
           </a:xfrm>
           <a:prstGeom prst="line">
             <a:avLst/>

</xml_diff>